<commit_message>
Update Week 11 Online Review.pptx
minor alignment and labelling new functionalities
</commit_message>
<xml_diff>
--- a/presentations/Week 11 Online Review.pptx
+++ b/presentations/Week 11 Online Review.pptx
@@ -4055,7 +4055,7 @@
         </p:nvSpPr>
         <p:spPr>
           <a:xfrm>
-            <a:off x="-157414" y="339522"/>
+            <a:off x="-54673" y="873776"/>
             <a:ext cx="8697449" cy="2847651"/>
           </a:xfrm>
           <a:prstGeom prst="rect">
@@ -4122,7 +4122,7 @@
         </p:nvSpPr>
         <p:spPr>
           <a:xfrm>
-            <a:off x="-2444" y="0"/>
+            <a:off x="-2444" y="431512"/>
             <a:ext cx="8810937" cy="1181999"/>
           </a:xfrm>
           <a:prstGeom prst="rect">
@@ -4135,7 +4135,7 @@
         </p:spPr>
         <p:txBody>
           <a:bodyPr anchor="ctr">
-            <a:normAutofit/>
+            <a:normAutofit fontScale="92500"/>
           </a:bodyPr>
           <a:lstStyle>
             <a:lvl1pPr algn="l" defTabSz="914400" rtl="0" eaLnBrk="1" latinLnBrk="0" hangingPunct="1">
@@ -4159,12 +4159,12 @@
           <a:p>
             <a:pPr algn="ctr"/>
             <a:r>
-              <a:rPr lang="en-US" sz="5400" b="1" dirty="0">
+              <a:rPr lang="en-US" sz="4800" b="1" dirty="0">
                 <a:latin typeface="WestayScript" panose="03000503000000000000" pitchFamily="66" charset="0"/>
               </a:rPr>
               <a:t>IS212 Software Project Management</a:t>
             </a:r>
-            <a:endParaRPr lang="en-SG" sz="5400" b="1" dirty="0">
+            <a:endParaRPr lang="en-SG" sz="4800" b="1" dirty="0">
               <a:latin typeface="WestayScript" panose="03000503000000000000" pitchFamily="66" charset="0"/>
             </a:endParaRPr>
           </a:p>
@@ -4186,7 +4186,7 @@
         </p:nvSpPr>
         <p:spPr>
           <a:xfrm>
-            <a:off x="-2340725" y="2247002"/>
+            <a:off x="-2443467" y="2247002"/>
             <a:ext cx="8697449" cy="2847651"/>
           </a:xfrm>
           <a:prstGeom prst="rect">
@@ -5361,7 +5361,7 @@
           <p:nvPr>
             <p:extLst>
               <p:ext uri="{D42A27DB-BD31-4B8C-83A1-F6EECF244321}">
-                <p14:modId xmlns:p14="http://schemas.microsoft.com/office/powerpoint/2010/main" val="3398363001"/>
+                <p14:modId xmlns:p14="http://schemas.microsoft.com/office/powerpoint/2010/main" val="2222874297"/>
               </p:ext>
             </p:extLst>
           </p:nvPr>
@@ -5607,9 +5607,42 @@
                           <a:latin typeface="Arial" panose="020B0604020202020204" pitchFamily="34" charset="0"/>
                           <a:cs typeface="Arial" panose="020B0604020202020204" pitchFamily="34" charset="0"/>
                         </a:rPr>
-                        <a:t>Login, add bid, bootstrap, update bid, delete bid, JSON web service (partial), round 1 clearing logic (partial)</a:t>
+                        <a:t>Login, add bid, bootstrap, </a:t>
+                      </a:r>
+                      <a:r>
+                        <a:rPr lang="en-US" dirty="0">
+                          <a:highlight>
+                            <a:srgbClr val="FFFF00"/>
+                          </a:highlight>
+                          <a:latin typeface="Arial" panose="020B0604020202020204" pitchFamily="34" charset="0"/>
+                          <a:cs typeface="Arial" panose="020B0604020202020204" pitchFamily="34" charset="0"/>
+                        </a:rPr>
+                        <a:t>[</a:t>
+                      </a:r>
+                      <a:r>
+                        <a:rPr lang="en-US">
+                          <a:highlight>
+                            <a:srgbClr val="FFFF00"/>
+                          </a:highlight>
+                          <a:latin typeface="Arial" panose="020B0604020202020204" pitchFamily="34" charset="0"/>
+                          <a:cs typeface="Arial" panose="020B0604020202020204" pitchFamily="34" charset="0"/>
+                        </a:rPr>
+                        <a:t>NEW] Update </a:t>
+                      </a:r>
+                      <a:r>
+                        <a:rPr lang="en-US" dirty="0">
+                          <a:highlight>
+                            <a:srgbClr val="FFFF00"/>
+                          </a:highlight>
+                          <a:latin typeface="Arial" panose="020B0604020202020204" pitchFamily="34" charset="0"/>
+                          <a:cs typeface="Arial" panose="020B0604020202020204" pitchFamily="34" charset="0"/>
+                        </a:rPr>
+                        <a:t>bid, delete bid, JSON web service (partial), round 1 clearing logic (partial)</a:t>
                       </a:r>
                       <a:endParaRPr lang="en-SG" dirty="0">
+                        <a:highlight>
+                          <a:srgbClr val="FFFF00"/>
+                        </a:highlight>
                         <a:latin typeface="Arial" panose="020B0604020202020204" pitchFamily="34" charset="0"/>
                         <a:cs typeface="Arial" panose="020B0604020202020204" pitchFamily="34" charset="0"/>
                       </a:endParaRPr>

</xml_diff>